<commit_message>
merged into ppt also
</commit_message>
<xml_diff>
--- a/ppts/Sales_Forecasting_Design_B4.pptx
+++ b/ppts/Sales_Forecasting_Design_B4.pptx
@@ -20,7 +20,7 @@
     <p:sldId id="268" r:id="rId15"/>
   </p:sldIdLst>
   <p:sldSz cx="7920038" cy="3959225"/>
-  <p:notesSz cx="6858000" cy="9144000"/>
+  <p:notesSz cx="7559675" cy="10691813"/>
 </p:presentation>
 </file>
 
@@ -55,7 +55,7 @@
         <p:txBody>
           <a:bodyPr/>
           <a:p>
-            <a:fld id="{78373526-8016-4AE4-9B29-5B5694D3AA89}" type="slidenum">
+            <a:fld id="{D239A0FA-EA1D-4D1B-89CC-BF332F3E360D}" type="slidenum">
               <a:t>&lt;#&gt;</a:t>
             </a:fld>
           </a:p>
@@ -111,10 +111,10 @@
             <a:noAutofit/>
           </a:bodyPr>
           <a:p>
-            <a:endParaRPr b="0" lang="en-IN" sz="1400" spc="-1" strike="noStrike">
-              <a:solidFill>
-                <a:srgbClr val="000000"/>
-              </a:solidFill>
+            <a:pPr algn="ctr">
+              <a:buNone/>
+            </a:pPr>
+            <a:endParaRPr b="0" lang="en-IN" sz="4400" spc="-1" strike="noStrike">
               <a:latin typeface="Arial"/>
             </a:endParaRPr>
           </a:p>
@@ -148,10 +148,7 @@
             <a:normAutofit/>
           </a:bodyPr>
           <a:p>
-            <a:endParaRPr b="0" lang="en-IN" sz="1400" spc="-1" strike="noStrike">
-              <a:solidFill>
-                <a:srgbClr val="000000"/>
-              </a:solidFill>
+            <a:endParaRPr b="0" lang="en-IN" sz="3200" spc="-1" strike="noStrike">
               <a:latin typeface="Arial"/>
             </a:endParaRPr>
           </a:p>
@@ -185,10 +182,7 @@
             <a:normAutofit/>
           </a:bodyPr>
           <a:p>
-            <a:endParaRPr b="0" lang="en-IN" sz="1400" spc="-1" strike="noStrike">
-              <a:solidFill>
-                <a:srgbClr val="000000"/>
-              </a:solidFill>
+            <a:endParaRPr b="0" lang="en-IN" sz="3200" spc="-1" strike="noStrike">
               <a:latin typeface="Arial"/>
             </a:endParaRPr>
           </a:p>
@@ -208,7 +202,7 @@
         <p:txBody>
           <a:bodyPr/>
           <a:p>
-            <a:fld id="{FE5B7C81-6380-4C1B-8F9C-5B523495A60A}" type="slidenum">
+            <a:fld id="{90FE3192-5330-46A0-8AE4-C5DEAD6AA4D1}" type="slidenum">
               <a:t>&lt;#&gt;</a:t>
             </a:fld>
           </a:p>
@@ -264,10 +258,10 @@
             <a:noAutofit/>
           </a:bodyPr>
           <a:p>
-            <a:endParaRPr b="0" lang="en-IN" sz="1400" spc="-1" strike="noStrike">
-              <a:solidFill>
-                <a:srgbClr val="000000"/>
-              </a:solidFill>
+            <a:pPr algn="ctr">
+              <a:buNone/>
+            </a:pPr>
+            <a:endParaRPr b="0" lang="en-IN" sz="4400" spc="-1" strike="noStrike">
               <a:latin typeface="Arial"/>
             </a:endParaRPr>
           </a:p>
@@ -301,10 +295,7 @@
             <a:normAutofit/>
           </a:bodyPr>
           <a:p>
-            <a:endParaRPr b="0" lang="en-IN" sz="1400" spc="-1" strike="noStrike">
-              <a:solidFill>
-                <a:srgbClr val="000000"/>
-              </a:solidFill>
+            <a:endParaRPr b="0" lang="en-IN" sz="3200" spc="-1" strike="noStrike">
               <a:latin typeface="Arial"/>
             </a:endParaRPr>
           </a:p>
@@ -338,10 +329,7 @@
             <a:normAutofit/>
           </a:bodyPr>
           <a:p>
-            <a:endParaRPr b="0" lang="en-IN" sz="1400" spc="-1" strike="noStrike">
-              <a:solidFill>
-                <a:srgbClr val="000000"/>
-              </a:solidFill>
+            <a:endParaRPr b="0" lang="en-IN" sz="3200" spc="-1" strike="noStrike">
               <a:latin typeface="Arial"/>
             </a:endParaRPr>
           </a:p>
@@ -375,10 +363,7 @@
             <a:normAutofit/>
           </a:bodyPr>
           <a:p>
-            <a:endParaRPr b="0" lang="en-IN" sz="1400" spc="-1" strike="noStrike">
-              <a:solidFill>
-                <a:srgbClr val="000000"/>
-              </a:solidFill>
+            <a:endParaRPr b="0" lang="en-IN" sz="3200" spc="-1" strike="noStrike">
               <a:latin typeface="Arial"/>
             </a:endParaRPr>
           </a:p>
@@ -412,10 +397,7 @@
             <a:normAutofit/>
           </a:bodyPr>
           <a:p>
-            <a:endParaRPr b="0" lang="en-IN" sz="1400" spc="-1" strike="noStrike">
-              <a:solidFill>
-                <a:srgbClr val="000000"/>
-              </a:solidFill>
+            <a:endParaRPr b="0" lang="en-IN" sz="3200" spc="-1" strike="noStrike">
               <a:latin typeface="Arial"/>
             </a:endParaRPr>
           </a:p>
@@ -435,7 +417,7 @@
         <p:txBody>
           <a:bodyPr/>
           <a:p>
-            <a:fld id="{B7B5557C-CCF9-4B88-8A1E-B17B8C94FB3A}" type="slidenum">
+            <a:fld id="{E10E37FB-2778-4BC7-8BB1-09D9D058B495}" type="slidenum">
               <a:t>&lt;#&gt;</a:t>
             </a:fld>
           </a:p>
@@ -491,10 +473,10 @@
             <a:noAutofit/>
           </a:bodyPr>
           <a:p>
-            <a:endParaRPr b="0" lang="en-IN" sz="1400" spc="-1" strike="noStrike">
-              <a:solidFill>
-                <a:srgbClr val="000000"/>
-              </a:solidFill>
+            <a:pPr algn="ctr">
+              <a:buNone/>
+            </a:pPr>
+            <a:endParaRPr b="0" lang="en-IN" sz="4400" spc="-1" strike="noStrike">
               <a:latin typeface="Arial"/>
             </a:endParaRPr>
           </a:p>
@@ -528,10 +510,7 @@
             <a:normAutofit/>
           </a:bodyPr>
           <a:p>
-            <a:endParaRPr b="0" lang="en-IN" sz="1400" spc="-1" strike="noStrike">
-              <a:solidFill>
-                <a:srgbClr val="000000"/>
-              </a:solidFill>
+            <a:endParaRPr b="0" lang="en-IN" sz="3200" spc="-1" strike="noStrike">
               <a:latin typeface="Arial"/>
             </a:endParaRPr>
           </a:p>
@@ -565,10 +544,7 @@
             <a:normAutofit/>
           </a:bodyPr>
           <a:p>
-            <a:endParaRPr b="0" lang="en-IN" sz="1400" spc="-1" strike="noStrike">
-              <a:solidFill>
-                <a:srgbClr val="000000"/>
-              </a:solidFill>
+            <a:endParaRPr b="0" lang="en-IN" sz="3200" spc="-1" strike="noStrike">
               <a:latin typeface="Arial"/>
             </a:endParaRPr>
           </a:p>
@@ -602,10 +578,7 @@
             <a:normAutofit/>
           </a:bodyPr>
           <a:p>
-            <a:endParaRPr b="0" lang="en-IN" sz="1400" spc="-1" strike="noStrike">
-              <a:solidFill>
-                <a:srgbClr val="000000"/>
-              </a:solidFill>
+            <a:endParaRPr b="0" lang="en-IN" sz="3200" spc="-1" strike="noStrike">
               <a:latin typeface="Arial"/>
             </a:endParaRPr>
           </a:p>
@@ -639,10 +612,7 @@
             <a:normAutofit/>
           </a:bodyPr>
           <a:p>
-            <a:endParaRPr b="0" lang="en-IN" sz="1400" spc="-1" strike="noStrike">
-              <a:solidFill>
-                <a:srgbClr val="000000"/>
-              </a:solidFill>
+            <a:endParaRPr b="0" lang="en-IN" sz="3200" spc="-1" strike="noStrike">
               <a:latin typeface="Arial"/>
             </a:endParaRPr>
           </a:p>
@@ -676,10 +646,7 @@
             <a:normAutofit/>
           </a:bodyPr>
           <a:p>
-            <a:endParaRPr b="0" lang="en-IN" sz="1400" spc="-1" strike="noStrike">
-              <a:solidFill>
-                <a:srgbClr val="000000"/>
-              </a:solidFill>
+            <a:endParaRPr b="0" lang="en-IN" sz="3200" spc="-1" strike="noStrike">
               <a:latin typeface="Arial"/>
             </a:endParaRPr>
           </a:p>
@@ -713,10 +680,7 @@
             <a:normAutofit/>
           </a:bodyPr>
           <a:p>
-            <a:endParaRPr b="0" lang="en-IN" sz="1400" spc="-1" strike="noStrike">
-              <a:solidFill>
-                <a:srgbClr val="000000"/>
-              </a:solidFill>
+            <a:endParaRPr b="0" lang="en-IN" sz="3200" spc="-1" strike="noStrike">
               <a:latin typeface="Arial"/>
             </a:endParaRPr>
           </a:p>
@@ -736,7 +700,7 @@
         <p:txBody>
           <a:bodyPr/>
           <a:p>
-            <a:fld id="{C915179F-E8DD-4CF3-B7F2-DD535F8093A5}" type="slidenum">
+            <a:fld id="{C16530B2-9E51-4AB8-8CAA-43B64F4470F0}" type="slidenum">
               <a:t>&lt;#&gt;</a:t>
             </a:fld>
           </a:p>
@@ -792,10 +756,10 @@
             <a:noAutofit/>
           </a:bodyPr>
           <a:p>
-            <a:endParaRPr b="0" lang="en-IN" sz="1400" spc="-1" strike="noStrike">
-              <a:solidFill>
-                <a:srgbClr val="000000"/>
-              </a:solidFill>
+            <a:pPr algn="ctr">
+              <a:buNone/>
+            </a:pPr>
+            <a:endParaRPr b="0" lang="en-IN" sz="4400" spc="-1" strike="noStrike">
               <a:latin typeface="Arial"/>
             </a:endParaRPr>
           </a:p>
@@ -852,7 +816,7 @@
         <p:txBody>
           <a:bodyPr/>
           <a:p>
-            <a:fld id="{62F1E008-2BB3-470E-BECE-2AEE901EF967}" type="slidenum">
+            <a:fld id="{8F50C1A5-2426-4201-9653-23B710DDAFFA}" type="slidenum">
               <a:t>&lt;#&gt;</a:t>
             </a:fld>
           </a:p>
@@ -908,10 +872,10 @@
             <a:noAutofit/>
           </a:bodyPr>
           <a:p>
-            <a:endParaRPr b="0" lang="en-IN" sz="1400" spc="-1" strike="noStrike">
-              <a:solidFill>
-                <a:srgbClr val="000000"/>
-              </a:solidFill>
+            <a:pPr algn="ctr">
+              <a:buNone/>
+            </a:pPr>
+            <a:endParaRPr b="0" lang="en-IN" sz="4400" spc="-1" strike="noStrike">
               <a:latin typeface="Arial"/>
             </a:endParaRPr>
           </a:p>
@@ -945,10 +909,7 @@
             <a:normAutofit/>
           </a:bodyPr>
           <a:p>
-            <a:endParaRPr b="0" lang="en-IN" sz="1400" spc="-1" strike="noStrike">
-              <a:solidFill>
-                <a:srgbClr val="000000"/>
-              </a:solidFill>
+            <a:endParaRPr b="0" lang="en-IN" sz="3200" spc="-1" strike="noStrike">
               <a:latin typeface="Arial"/>
             </a:endParaRPr>
           </a:p>
@@ -968,7 +929,7 @@
         <p:txBody>
           <a:bodyPr/>
           <a:p>
-            <a:fld id="{C8021BEF-08FA-440A-8C31-35E97742F726}" type="slidenum">
+            <a:fld id="{8826FF80-9628-44FA-BB4F-C5DF4D40BBD0}" type="slidenum">
               <a:t>&lt;#&gt;</a:t>
             </a:fld>
           </a:p>
@@ -1024,10 +985,10 @@
             <a:noAutofit/>
           </a:bodyPr>
           <a:p>
-            <a:endParaRPr b="0" lang="en-IN" sz="1400" spc="-1" strike="noStrike">
-              <a:solidFill>
-                <a:srgbClr val="000000"/>
-              </a:solidFill>
+            <a:pPr algn="ctr">
+              <a:buNone/>
+            </a:pPr>
+            <a:endParaRPr b="0" lang="en-IN" sz="4400" spc="-1" strike="noStrike">
               <a:latin typeface="Arial"/>
             </a:endParaRPr>
           </a:p>
@@ -1061,10 +1022,7 @@
             <a:normAutofit/>
           </a:bodyPr>
           <a:p>
-            <a:endParaRPr b="0" lang="en-IN" sz="1400" spc="-1" strike="noStrike">
-              <a:solidFill>
-                <a:srgbClr val="000000"/>
-              </a:solidFill>
+            <a:endParaRPr b="0" lang="en-IN" sz="3200" spc="-1" strike="noStrike">
               <a:latin typeface="Arial"/>
             </a:endParaRPr>
           </a:p>
@@ -1098,10 +1056,7 @@
             <a:normAutofit/>
           </a:bodyPr>
           <a:p>
-            <a:endParaRPr b="0" lang="en-IN" sz="1400" spc="-1" strike="noStrike">
-              <a:solidFill>
-                <a:srgbClr val="000000"/>
-              </a:solidFill>
+            <a:endParaRPr b="0" lang="en-IN" sz="3200" spc="-1" strike="noStrike">
               <a:latin typeface="Arial"/>
             </a:endParaRPr>
           </a:p>
@@ -1121,7 +1076,7 @@
         <p:txBody>
           <a:bodyPr/>
           <a:p>
-            <a:fld id="{17029454-C41D-4DC8-9EF4-AA459813BC82}" type="slidenum">
+            <a:fld id="{3C32C983-5ED0-4CA0-A305-294FCDF634A3}" type="slidenum">
               <a:t>&lt;#&gt;</a:t>
             </a:fld>
           </a:p>
@@ -1177,10 +1132,10 @@
             <a:noAutofit/>
           </a:bodyPr>
           <a:p>
-            <a:endParaRPr b="0" lang="en-IN" sz="1400" spc="-1" strike="noStrike">
-              <a:solidFill>
-                <a:srgbClr val="000000"/>
-              </a:solidFill>
+            <a:pPr algn="ctr">
+              <a:buNone/>
+            </a:pPr>
+            <a:endParaRPr b="0" lang="en-IN" sz="4400" spc="-1" strike="noStrike">
               <a:latin typeface="Arial"/>
             </a:endParaRPr>
           </a:p>
@@ -1200,7 +1155,7 @@
         <p:txBody>
           <a:bodyPr/>
           <a:p>
-            <a:fld id="{3602FA56-8272-4763-9BD0-487406780515}" type="slidenum">
+            <a:fld id="{5B885B70-54CF-417F-AF5D-73CB83D6F6D3}" type="slidenum">
               <a:t>&lt;#&gt;</a:t>
             </a:fld>
           </a:p>
@@ -1279,7 +1234,7 @@
         <p:txBody>
           <a:bodyPr/>
           <a:p>
-            <a:fld id="{FADE5124-FF49-443B-9915-4A0903166D82}" type="slidenum">
+            <a:fld id="{E61A088C-EB2C-495A-8FB9-68952C11B0CA}" type="slidenum">
               <a:t>&lt;#&gt;</a:t>
             </a:fld>
           </a:p>
@@ -1335,10 +1290,10 @@
             <a:noAutofit/>
           </a:bodyPr>
           <a:p>
-            <a:endParaRPr b="0" lang="en-IN" sz="1400" spc="-1" strike="noStrike">
-              <a:solidFill>
-                <a:srgbClr val="000000"/>
-              </a:solidFill>
+            <a:pPr algn="ctr">
+              <a:buNone/>
+            </a:pPr>
+            <a:endParaRPr b="0" lang="en-IN" sz="4400" spc="-1" strike="noStrike">
               <a:latin typeface="Arial"/>
             </a:endParaRPr>
           </a:p>
@@ -1372,10 +1327,7 @@
             <a:normAutofit/>
           </a:bodyPr>
           <a:p>
-            <a:endParaRPr b="0" lang="en-IN" sz="1400" spc="-1" strike="noStrike">
-              <a:solidFill>
-                <a:srgbClr val="000000"/>
-              </a:solidFill>
+            <a:endParaRPr b="0" lang="en-IN" sz="3200" spc="-1" strike="noStrike">
               <a:latin typeface="Arial"/>
             </a:endParaRPr>
           </a:p>
@@ -1409,10 +1361,7 @@
             <a:normAutofit/>
           </a:bodyPr>
           <a:p>
-            <a:endParaRPr b="0" lang="en-IN" sz="1400" spc="-1" strike="noStrike">
-              <a:solidFill>
-                <a:srgbClr val="000000"/>
-              </a:solidFill>
+            <a:endParaRPr b="0" lang="en-IN" sz="3200" spc="-1" strike="noStrike">
               <a:latin typeface="Arial"/>
             </a:endParaRPr>
           </a:p>
@@ -1446,10 +1395,7 @@
             <a:normAutofit/>
           </a:bodyPr>
           <a:p>
-            <a:endParaRPr b="0" lang="en-IN" sz="1400" spc="-1" strike="noStrike">
-              <a:solidFill>
-                <a:srgbClr val="000000"/>
-              </a:solidFill>
+            <a:endParaRPr b="0" lang="en-IN" sz="3200" spc="-1" strike="noStrike">
               <a:latin typeface="Arial"/>
             </a:endParaRPr>
           </a:p>
@@ -1469,7 +1415,7 @@
         <p:txBody>
           <a:bodyPr/>
           <a:p>
-            <a:fld id="{B19CAA3B-B2F1-4EEE-8474-4131D993AA40}" type="slidenum">
+            <a:fld id="{F777B3B7-85D4-4FC0-8434-4F4B7040D974}" type="slidenum">
               <a:t>&lt;#&gt;</a:t>
             </a:fld>
           </a:p>
@@ -1525,10 +1471,10 @@
             <a:noAutofit/>
           </a:bodyPr>
           <a:p>
-            <a:endParaRPr b="0" lang="en-IN" sz="1400" spc="-1" strike="noStrike">
-              <a:solidFill>
-                <a:srgbClr val="000000"/>
-              </a:solidFill>
+            <a:pPr algn="ctr">
+              <a:buNone/>
+            </a:pPr>
+            <a:endParaRPr b="0" lang="en-IN" sz="4400" spc="-1" strike="noStrike">
               <a:latin typeface="Arial"/>
             </a:endParaRPr>
           </a:p>
@@ -1562,10 +1508,7 @@
             <a:normAutofit/>
           </a:bodyPr>
           <a:p>
-            <a:endParaRPr b="0" lang="en-IN" sz="1400" spc="-1" strike="noStrike">
-              <a:solidFill>
-                <a:srgbClr val="000000"/>
-              </a:solidFill>
+            <a:endParaRPr b="0" lang="en-IN" sz="3200" spc="-1" strike="noStrike">
               <a:latin typeface="Arial"/>
             </a:endParaRPr>
           </a:p>
@@ -1599,10 +1542,7 @@
             <a:normAutofit/>
           </a:bodyPr>
           <a:p>
-            <a:endParaRPr b="0" lang="en-IN" sz="1400" spc="-1" strike="noStrike">
-              <a:solidFill>
-                <a:srgbClr val="000000"/>
-              </a:solidFill>
+            <a:endParaRPr b="0" lang="en-IN" sz="3200" spc="-1" strike="noStrike">
               <a:latin typeface="Arial"/>
             </a:endParaRPr>
           </a:p>
@@ -1636,10 +1576,7 @@
             <a:normAutofit/>
           </a:bodyPr>
           <a:p>
-            <a:endParaRPr b="0" lang="en-IN" sz="1400" spc="-1" strike="noStrike">
-              <a:solidFill>
-                <a:srgbClr val="000000"/>
-              </a:solidFill>
+            <a:endParaRPr b="0" lang="en-IN" sz="3200" spc="-1" strike="noStrike">
               <a:latin typeface="Arial"/>
             </a:endParaRPr>
           </a:p>
@@ -1659,7 +1596,7 @@
         <p:txBody>
           <a:bodyPr/>
           <a:p>
-            <a:fld id="{6A4A9237-FF02-4C22-8E1F-89E7A589D419}" type="slidenum">
+            <a:fld id="{0AAEDDE3-1494-4693-A99D-E4A4F1BA62FD}" type="slidenum">
               <a:t>&lt;#&gt;</a:t>
             </a:fld>
           </a:p>
@@ -1715,10 +1652,10 @@
             <a:noAutofit/>
           </a:bodyPr>
           <a:p>
-            <a:endParaRPr b="0" lang="en-IN" sz="1400" spc="-1" strike="noStrike">
-              <a:solidFill>
-                <a:srgbClr val="000000"/>
-              </a:solidFill>
+            <a:pPr algn="ctr">
+              <a:buNone/>
+            </a:pPr>
+            <a:endParaRPr b="0" lang="en-IN" sz="4400" spc="-1" strike="noStrike">
               <a:latin typeface="Arial"/>
             </a:endParaRPr>
           </a:p>
@@ -1752,10 +1689,7 @@
             <a:normAutofit/>
           </a:bodyPr>
           <a:p>
-            <a:endParaRPr b="0" lang="en-IN" sz="1400" spc="-1" strike="noStrike">
-              <a:solidFill>
-                <a:srgbClr val="000000"/>
-              </a:solidFill>
+            <a:endParaRPr b="0" lang="en-IN" sz="3200" spc="-1" strike="noStrike">
               <a:latin typeface="Arial"/>
             </a:endParaRPr>
           </a:p>
@@ -1789,10 +1723,7 @@
             <a:normAutofit/>
           </a:bodyPr>
           <a:p>
-            <a:endParaRPr b="0" lang="en-IN" sz="1400" spc="-1" strike="noStrike">
-              <a:solidFill>
-                <a:srgbClr val="000000"/>
-              </a:solidFill>
+            <a:endParaRPr b="0" lang="en-IN" sz="3200" spc="-1" strike="noStrike">
               <a:latin typeface="Arial"/>
             </a:endParaRPr>
           </a:p>
@@ -1826,10 +1757,7 @@
             <a:normAutofit/>
           </a:bodyPr>
           <a:p>
-            <a:endParaRPr b="0" lang="en-IN" sz="1400" spc="-1" strike="noStrike">
-              <a:solidFill>
-                <a:srgbClr val="000000"/>
-              </a:solidFill>
+            <a:endParaRPr b="0" lang="en-IN" sz="3200" spc="-1" strike="noStrike">
               <a:latin typeface="Arial"/>
             </a:endParaRPr>
           </a:p>
@@ -1849,7 +1777,7 @@
         <p:txBody>
           <a:bodyPr/>
           <a:p>
-            <a:fld id="{16EB89BB-0BE6-4F9E-9F14-522FDF0DF879}" type="slidenum">
+            <a:fld id="{6D740F90-7EF4-4A18-8D02-ABAC9807AA8E}" type="slidenum">
               <a:t>&lt;#&gt;</a:t>
             </a:fld>
           </a:p>
@@ -1897,7 +1825,7 @@
         <p:spPr>
           <a:xfrm>
             <a:off x="7338240" y="3589560"/>
-            <a:ext cx="474840" cy="302760"/>
+            <a:ext cx="474480" cy="302400"/>
           </a:xfrm>
           <a:prstGeom prst="rect">
             <a:avLst/>
@@ -1909,7 +1837,7 @@
         </p:spPr>
         <p:txBody>
           <a:bodyPr lIns="76320" rIns="76320" tIns="76320" bIns="76320" anchor="ctr">
-            <a:normAutofit/>
+            <a:noAutofit/>
           </a:bodyPr>
           <a:lstStyle>
             <a:lvl1pPr algn="r">
@@ -1939,7 +1867,7 @@
                 <a:tab algn="l" pos="0"/>
               </a:tabLst>
             </a:pPr>
-            <a:fld id="{1DFE467E-DB7C-4758-8BE7-AAF712BBF9FD}" type="slidenum">
+            <a:fld id="{076DC1A0-6912-4338-82FF-B79884775A56}" type="slidenum">
               <a:rPr b="0" lang="en-IN" sz="800" spc="-1" strike="noStrike">
                 <a:solidFill>
                   <a:srgbClr val="ffffff"/>
@@ -1983,19 +1911,16 @@
             <a:noAutofit/>
           </a:bodyPr>
           <a:p>
-            <a:r>
-              <a:rPr b="0" lang="en-IN" sz="1400" spc="-1" strike="noStrike">
-                <a:solidFill>
-                  <a:srgbClr val="000000"/>
-                </a:solidFill>
+            <a:pPr algn="ctr">
+              <a:buNone/>
+            </a:pPr>
+            <a:r>
+              <a:rPr b="0" lang="en-IN" sz="4400" spc="-1" strike="noStrike">
                 <a:latin typeface="Arial"/>
               </a:rPr>
               <a:t>Click to edit the title text format</a:t>
             </a:r>
-            <a:endParaRPr b="0" lang="en-IN" sz="1400" spc="-1" strike="noStrike">
-              <a:solidFill>
-                <a:srgbClr val="000000"/>
-              </a:solidFill>
+            <a:endParaRPr b="0" lang="en-IN" sz="4400" spc="-1" strike="noStrike">
               <a:latin typeface="Arial"/>
             </a:endParaRPr>
           </a:p>
@@ -2026,7 +1951,7 @@
         </p:spPr>
         <p:txBody>
           <a:bodyPr lIns="0" rIns="0" tIns="0" bIns="0" anchor="t">
-            <a:normAutofit/>
+            <a:normAutofit fontScale="83000"/>
           </a:bodyPr>
           <a:p>
             <a:pPr marL="432000" indent="-324000">
@@ -2041,18 +1966,12 @@
               <a:buChar char=""/>
             </a:pPr>
             <a:r>
-              <a:rPr b="0" lang="en-IN" sz="1400" spc="-1" strike="noStrike">
-                <a:solidFill>
-                  <a:srgbClr val="000000"/>
-                </a:solidFill>
+              <a:rPr b="0" lang="en-IN" sz="3200" spc="-1" strike="noStrike">
                 <a:latin typeface="Arial"/>
               </a:rPr>
               <a:t>Click to edit the outline text format</a:t>
             </a:r>
-            <a:endParaRPr b="0" lang="en-IN" sz="1400" spc="-1" strike="noStrike">
-              <a:solidFill>
-                <a:srgbClr val="000000"/>
-              </a:solidFill>
+            <a:endParaRPr b="0" lang="en-IN" sz="3200" spc="-1" strike="noStrike">
               <a:latin typeface="Arial"/>
             </a:endParaRPr>
           </a:p>
@@ -2069,18 +1988,12 @@
               <a:buChar char=""/>
             </a:pPr>
             <a:r>
-              <a:rPr b="0" lang="en-IN" sz="1400" spc="-1" strike="noStrike">
-                <a:solidFill>
-                  <a:srgbClr val="000000"/>
-                </a:solidFill>
+              <a:rPr b="0" lang="en-IN" sz="2800" spc="-1" strike="noStrike">
                 <a:latin typeface="Arial"/>
               </a:rPr>
               <a:t>Second Outline Level</a:t>
             </a:r>
-            <a:endParaRPr b="0" lang="en-IN" sz="1400" spc="-1" strike="noStrike">
-              <a:solidFill>
-                <a:srgbClr val="000000"/>
-              </a:solidFill>
+            <a:endParaRPr b="0" lang="en-IN" sz="2800" spc="-1" strike="noStrike">
               <a:latin typeface="Arial"/>
             </a:endParaRPr>
           </a:p>
@@ -2097,18 +2010,12 @@
               <a:buChar char=""/>
             </a:pPr>
             <a:r>
-              <a:rPr b="0" lang="en-IN" sz="1400" spc="-1" strike="noStrike">
-                <a:solidFill>
-                  <a:srgbClr val="000000"/>
-                </a:solidFill>
+              <a:rPr b="0" lang="en-IN" sz="2400" spc="-1" strike="noStrike">
                 <a:latin typeface="Arial"/>
               </a:rPr>
               <a:t>Third Outline Level</a:t>
             </a:r>
-            <a:endParaRPr b="0" lang="en-IN" sz="1400" spc="-1" strike="noStrike">
-              <a:solidFill>
-                <a:srgbClr val="000000"/>
-              </a:solidFill>
+            <a:endParaRPr b="0" lang="en-IN" sz="2400" spc="-1" strike="noStrike">
               <a:latin typeface="Arial"/>
             </a:endParaRPr>
           </a:p>
@@ -2125,18 +2032,12 @@
               <a:buChar char=""/>
             </a:pPr>
             <a:r>
-              <a:rPr b="0" lang="en-IN" sz="1400" spc="-1" strike="noStrike">
-                <a:solidFill>
-                  <a:srgbClr val="000000"/>
-                </a:solidFill>
+              <a:rPr b="0" lang="en-IN" sz="2000" spc="-1" strike="noStrike">
                 <a:latin typeface="Arial"/>
               </a:rPr>
               <a:t>Fourth Outline Level</a:t>
             </a:r>
-            <a:endParaRPr b="0" lang="en-IN" sz="1400" spc="-1" strike="noStrike">
-              <a:solidFill>
-                <a:srgbClr val="000000"/>
-              </a:solidFill>
+            <a:endParaRPr b="0" lang="en-IN" sz="2000" spc="-1" strike="noStrike">
               <a:latin typeface="Arial"/>
             </a:endParaRPr>
           </a:p>
@@ -2154,17 +2055,11 @@
             </a:pPr>
             <a:r>
               <a:rPr b="0" lang="en-IN" sz="2000" spc="-1" strike="noStrike">
-                <a:solidFill>
-                  <a:srgbClr val="000000"/>
-                </a:solidFill>
                 <a:latin typeface="Arial"/>
               </a:rPr>
               <a:t>Fifth Outline Level</a:t>
             </a:r>
             <a:endParaRPr b="0" lang="en-IN" sz="2000" spc="-1" strike="noStrike">
-              <a:solidFill>
-                <a:srgbClr val="000000"/>
-              </a:solidFill>
               <a:latin typeface="Arial"/>
             </a:endParaRPr>
           </a:p>
@@ -2182,17 +2077,11 @@
             </a:pPr>
             <a:r>
               <a:rPr b="0" lang="en-IN" sz="2000" spc="-1" strike="noStrike">
-                <a:solidFill>
-                  <a:srgbClr val="000000"/>
-                </a:solidFill>
                 <a:latin typeface="Arial"/>
               </a:rPr>
               <a:t>Sixth Outline Level</a:t>
             </a:r>
             <a:endParaRPr b="0" lang="en-IN" sz="2000" spc="-1" strike="noStrike">
-              <a:solidFill>
-                <a:srgbClr val="000000"/>
-              </a:solidFill>
               <a:latin typeface="Arial"/>
             </a:endParaRPr>
           </a:p>
@@ -2210,17 +2099,11 @@
             </a:pPr>
             <a:r>
               <a:rPr b="0" lang="en-IN" sz="2000" spc="-1" strike="noStrike">
-                <a:solidFill>
-                  <a:srgbClr val="000000"/>
-                </a:solidFill>
                 <a:latin typeface="Arial"/>
               </a:rPr>
               <a:t>Seventh Outline Level</a:t>
             </a:r>
             <a:endParaRPr b="0" lang="en-IN" sz="2000" spc="-1" strike="noStrike">
-              <a:solidFill>
-                <a:srgbClr val="000000"/>
-              </a:solidFill>
               <a:latin typeface="Arial"/>
             </a:endParaRPr>
           </a:p>
@@ -2291,7 +2174,7 @@
         <p:spPr>
           <a:xfrm>
             <a:off x="1080" y="1206720"/>
-            <a:ext cx="7919280" cy="461160"/>
+            <a:ext cx="7918920" cy="460800"/>
           </a:xfrm>
           <a:prstGeom prst="rect">
             <a:avLst/>
@@ -2330,9 +2213,6 @@
               <a:t>Store Sales time series forecasting</a:t>
             </a:r>
             <a:endParaRPr b="0" lang="en-IN" sz="3200" spc="-1" strike="noStrike">
-              <a:solidFill>
-                <a:srgbClr val="000000"/>
-              </a:solidFill>
               <a:latin typeface="Arial"/>
             </a:endParaRPr>
           </a:p>
@@ -2351,7 +2231,7 @@
         <p:spPr>
           <a:xfrm>
             <a:off x="7338240" y="3589560"/>
-            <a:ext cx="474840" cy="302760"/>
+            <a:ext cx="474480" cy="302400"/>
           </a:xfrm>
           <a:prstGeom prst="rect">
             <a:avLst/>
@@ -2393,7 +2273,7 @@
                 <a:tab algn="l" pos="0"/>
               </a:tabLst>
             </a:pPr>
-            <a:fld id="{5B9C401D-E03A-4320-91C3-5BF94474D821}" type="slidenum">
+            <a:fld id="{80F895E3-BDD4-4232-8023-6B293116FFA9}" type="slidenum">
               <a:rPr b="0" lang="en-IN" sz="800" spc="-1" strike="noStrike">
                 <a:solidFill>
                   <a:srgbClr val="ffffff"/>
@@ -2418,7 +2298,7 @@
         <p:spPr>
           <a:xfrm>
             <a:off x="3771360" y="1801080"/>
-            <a:ext cx="10800" cy="1026720"/>
+            <a:ext cx="10440" cy="1026360"/>
           </a:xfrm>
           <a:custGeom>
             <a:avLst/>
@@ -2460,7 +2340,7 @@
         <p:spPr>
           <a:xfrm>
             <a:off x="2162160" y="720000"/>
-            <a:ext cx="3239640" cy="355320"/>
+            <a:ext cx="3239280" cy="354960"/>
           </a:xfrm>
           <a:prstGeom prst="rect">
             <a:avLst/>
@@ -2513,7 +2393,7 @@
         <p:spPr>
           <a:xfrm>
             <a:off x="739440" y="1923120"/>
-            <a:ext cx="2845080" cy="576360"/>
+            <a:ext cx="2844720" cy="576000"/>
           </a:xfrm>
           <a:prstGeom prst="rect">
             <a:avLst/>
@@ -2614,7 +2494,7 @@
         <p:spPr>
           <a:xfrm>
             <a:off x="3927600" y="1867680"/>
-            <a:ext cx="3773520" cy="879120"/>
+            <a:ext cx="3773160" cy="878760"/>
           </a:xfrm>
           <a:prstGeom prst="rect">
             <a:avLst/>
@@ -2828,7 +2708,7 @@
         <p:spPr>
           <a:xfrm>
             <a:off x="360" y="200160"/>
-            <a:ext cx="7919280" cy="699480"/>
+            <a:ext cx="7918920" cy="699120"/>
           </a:xfrm>
           <a:prstGeom prst="rect">
             <a:avLst/>
@@ -2887,7 +2767,7 @@
         <p:spPr>
           <a:xfrm>
             <a:off x="-3240" y="720000"/>
-            <a:ext cx="7919640" cy="3130560"/>
+            <a:ext cx="7919640" cy="3194280"/>
           </a:xfrm>
           <a:prstGeom prst="rect">
             <a:avLst/>
@@ -2936,7 +2816,7 @@
         <p:spPr>
           <a:xfrm>
             <a:off x="360" y="200160"/>
-            <a:ext cx="7919280" cy="699480"/>
+            <a:ext cx="7918920" cy="699120"/>
           </a:xfrm>
           <a:prstGeom prst="rect">
             <a:avLst/>
@@ -2995,7 +2875,7 @@
         <p:spPr>
           <a:xfrm>
             <a:off x="0" y="899640"/>
-            <a:ext cx="7920000" cy="3057840"/>
+            <a:ext cx="7919640" cy="3057480"/>
           </a:xfrm>
           <a:prstGeom prst="rect">
             <a:avLst/>
@@ -3044,7 +2924,7 @@
         <p:spPr>
           <a:xfrm>
             <a:off x="360" y="200160"/>
-            <a:ext cx="7919280" cy="699480"/>
+            <a:ext cx="7918920" cy="699120"/>
           </a:xfrm>
           <a:prstGeom prst="rect">
             <a:avLst/>
@@ -3102,8 +2982,8 @@
         </p:blipFill>
         <p:spPr>
           <a:xfrm rot="21583800">
-            <a:off x="1807200" y="753840"/>
-            <a:ext cx="4500000" cy="3151080"/>
+            <a:off x="1806840" y="753840"/>
+            <a:ext cx="4499640" cy="3150720"/>
           </a:xfrm>
           <a:prstGeom prst="rect">
             <a:avLst/>
@@ -3152,7 +3032,7 @@
         <p:spPr>
           <a:xfrm>
             <a:off x="360" y="200160"/>
-            <a:ext cx="7919280" cy="699480"/>
+            <a:ext cx="7918920" cy="699120"/>
           </a:xfrm>
           <a:prstGeom prst="rect">
             <a:avLst/>
@@ -3207,7 +3087,7 @@
         <p:spPr>
           <a:xfrm>
             <a:off x="515160" y="968760"/>
-            <a:ext cx="6682320" cy="1071720"/>
+            <a:ext cx="6681960" cy="1071720"/>
           </a:xfrm>
           <a:prstGeom prst="rect">
             <a:avLst/>
@@ -3292,7 +3172,7 @@
         <p:spPr>
           <a:xfrm>
             <a:off x="3240" y="2365200"/>
-            <a:ext cx="7919280" cy="699480"/>
+            <a:ext cx="7918920" cy="699120"/>
           </a:xfrm>
           <a:prstGeom prst="rect">
             <a:avLst/>
@@ -3396,7 +3276,7 @@
         <p:spPr>
           <a:xfrm>
             <a:off x="720" y="1181520"/>
-            <a:ext cx="7919640" cy="460800"/>
+            <a:ext cx="7919280" cy="460440"/>
           </a:xfrm>
           <a:prstGeom prst="rect">
             <a:avLst/>
@@ -3438,9 +3318,6 @@
               <a:t>Project Statement</a:t>
             </a:r>
             <a:endParaRPr b="0" lang="en-IN" sz="4000" spc="-1" strike="noStrike">
-              <a:solidFill>
-                <a:srgbClr val="000000"/>
-              </a:solidFill>
               <a:latin typeface="Arial"/>
             </a:endParaRPr>
           </a:p>
@@ -3459,7 +3336,7 @@
         <p:spPr>
           <a:xfrm>
             <a:off x="7338240" y="3589560"/>
-            <a:ext cx="474840" cy="302760"/>
+            <a:ext cx="474480" cy="302400"/>
           </a:xfrm>
           <a:prstGeom prst="rect">
             <a:avLst/>
@@ -3501,7 +3378,7 @@
                 <a:tab algn="l" pos="0"/>
               </a:tabLst>
             </a:pPr>
-            <a:fld id="{37E41278-19CB-4E22-9749-08427CA31DB8}" type="slidenum">
+            <a:fld id="{6F9160F9-5B07-48DE-B078-65413C28F5DA}" type="slidenum">
               <a:rPr b="0" lang="en-IN" sz="800" spc="-1" strike="noStrike">
                 <a:solidFill>
                   <a:srgbClr val="ffffff"/>
@@ -3526,7 +3403,7 @@
         <p:spPr>
           <a:xfrm>
             <a:off x="1075320" y="1758960"/>
-            <a:ext cx="6187680" cy="912960"/>
+            <a:ext cx="6187320" cy="912600"/>
           </a:xfrm>
           <a:prstGeom prst="rect">
             <a:avLst/>
@@ -3648,7 +3525,7 @@
         <p:spPr>
           <a:xfrm>
             <a:off x="7338240" y="3589560"/>
-            <a:ext cx="474840" cy="302760"/>
+            <a:ext cx="474480" cy="302400"/>
           </a:xfrm>
           <a:prstGeom prst="rect">
             <a:avLst/>
@@ -3690,7 +3567,7 @@
                 <a:tab algn="l" pos="0"/>
               </a:tabLst>
             </a:pPr>
-            <a:fld id="{AEC1F48C-A054-47A3-B620-84489F9B1EF1}" type="slidenum">
+            <a:fld id="{39FF29C4-2153-494F-8F31-10CE29DC0DAD}" type="slidenum">
               <a:rPr b="0" lang="en-IN" sz="800" spc="-1" strike="noStrike">
                 <a:solidFill>
                   <a:srgbClr val="ffffff"/>
@@ -3715,7 +3592,7 @@
         <p:spPr>
           <a:xfrm>
             <a:off x="360" y="1374480"/>
-            <a:ext cx="7919280" cy="236160"/>
+            <a:ext cx="7918920" cy="235800"/>
           </a:xfrm>
           <a:prstGeom prst="rect">
             <a:avLst/>
@@ -3741,7 +3618,7 @@
         <p:spPr>
           <a:xfrm>
             <a:off x="414000" y="824040"/>
-            <a:ext cx="7159680" cy="2844000"/>
+            <a:ext cx="7159320" cy="2843640"/>
           </a:xfrm>
           <a:prstGeom prst="rect">
             <a:avLst/>
@@ -3818,7 +3695,7 @@
         <p:spPr>
           <a:xfrm>
             <a:off x="360" y="200160"/>
-            <a:ext cx="7919280" cy="699480"/>
+            <a:ext cx="7918920" cy="699120"/>
           </a:xfrm>
           <a:prstGeom prst="rect">
             <a:avLst/>
@@ -3903,7 +3780,7 @@
         <p:spPr>
           <a:xfrm>
             <a:off x="360" y="200160"/>
-            <a:ext cx="7919280" cy="699480"/>
+            <a:ext cx="7918920" cy="699120"/>
           </a:xfrm>
           <a:prstGeom prst="rect">
             <a:avLst/>
@@ -3958,7 +3835,7 @@
         <p:spPr>
           <a:xfrm>
             <a:off x="609480" y="1075320"/>
-            <a:ext cx="6682320" cy="2268360"/>
+            <a:ext cx="6681960" cy="2268000"/>
           </a:xfrm>
           <a:prstGeom prst="rect">
             <a:avLst/>
@@ -4172,7 +4049,7 @@
         <p:spPr>
           <a:xfrm>
             <a:off x="360" y="200160"/>
-            <a:ext cx="7919280" cy="699480"/>
+            <a:ext cx="7918920" cy="699120"/>
           </a:xfrm>
           <a:prstGeom prst="rect">
             <a:avLst/>
@@ -4236,13 +4113,13 @@
         </p:nvPicPr>
         <p:blipFill>
           <a:blip r:embed="rId1"/>
-          <a:srcRect l="33272" t="27545" r="43965" b="26586"/>
+          <a:srcRect l="33268" t="27542" r="43961" b="26583"/>
           <a:stretch/>
         </p:blipFill>
         <p:spPr>
           <a:xfrm>
             <a:off x="833760" y="1179000"/>
-            <a:ext cx="2328840" cy="2300040"/>
+            <a:ext cx="2328480" cy="2299680"/>
           </a:xfrm>
           <a:prstGeom prst="rect">
             <a:avLst/>
@@ -4261,7 +4138,7 @@
         <p:spPr>
           <a:xfrm>
             <a:off x="3531240" y="954720"/>
-            <a:ext cx="4226760" cy="2861640"/>
+            <a:ext cx="4226400" cy="2861640"/>
           </a:xfrm>
           <a:prstGeom prst="rect">
             <a:avLst/>
@@ -4343,7 +4220,7 @@
         <p:spPr>
           <a:xfrm>
             <a:off x="360" y="200160"/>
-            <a:ext cx="7919280" cy="699480"/>
+            <a:ext cx="7918920" cy="699120"/>
           </a:xfrm>
           <a:prstGeom prst="rect">
             <a:avLst/>
@@ -4413,7 +4290,7 @@
         <p:spPr>
           <a:xfrm>
             <a:off x="164520" y="1336320"/>
-            <a:ext cx="3262680" cy="1550160"/>
+            <a:ext cx="3262320" cy="1549800"/>
           </a:xfrm>
           <a:prstGeom prst="rect">
             <a:avLst/>
@@ -4432,7 +4309,7 @@
         <p:spPr>
           <a:xfrm>
             <a:off x="3548160" y="1018080"/>
-            <a:ext cx="4151880" cy="2279880"/>
+            <a:ext cx="4151520" cy="2279880"/>
           </a:xfrm>
           <a:prstGeom prst="rect">
             <a:avLst/>
@@ -4514,7 +4391,7 @@
         <p:spPr>
           <a:xfrm>
             <a:off x="360" y="200160"/>
-            <a:ext cx="7919280" cy="699480"/>
+            <a:ext cx="7918920" cy="699120"/>
           </a:xfrm>
           <a:prstGeom prst="rect">
             <a:avLst/>
@@ -4578,13 +4455,13 @@
         </p:nvPicPr>
         <p:blipFill>
           <a:blip r:embed="rId1"/>
-          <a:srcRect l="0" t="-521" r="58249" b="0"/>
+          <a:srcRect l="0" t="-521" r="58243" b="0"/>
           <a:stretch/>
         </p:blipFill>
         <p:spPr>
           <a:xfrm>
             <a:off x="267840" y="1080000"/>
-            <a:ext cx="3547800" cy="2519640"/>
+            <a:ext cx="3547440" cy="2519280"/>
           </a:xfrm>
           <a:prstGeom prst="rect">
             <a:avLst/>
@@ -4603,7 +4480,7 @@
         <p:spPr>
           <a:xfrm>
             <a:off x="4014000" y="1104120"/>
-            <a:ext cx="3743640" cy="2462400"/>
+            <a:ext cx="3743280" cy="2462400"/>
           </a:xfrm>
           <a:prstGeom prst="rect">
             <a:avLst/>
@@ -4685,7 +4562,7 @@
         <p:spPr>
           <a:xfrm>
             <a:off x="360" y="200160"/>
-            <a:ext cx="7919280" cy="699480"/>
+            <a:ext cx="7918920" cy="699120"/>
           </a:xfrm>
           <a:prstGeom prst="rect">
             <a:avLst/>
@@ -4754,7 +4631,7 @@
         <p:spPr>
           <a:xfrm>
             <a:off x="287640" y="1138680"/>
-            <a:ext cx="3329280" cy="2401560"/>
+            <a:ext cx="3328920" cy="2401200"/>
           </a:xfrm>
           <a:prstGeom prst="rect">
             <a:avLst/>
@@ -4773,7 +4650,7 @@
         <p:spPr>
           <a:xfrm>
             <a:off x="3960000" y="1500840"/>
-            <a:ext cx="3607920" cy="1871640"/>
+            <a:ext cx="3607560" cy="1871640"/>
           </a:xfrm>
           <a:prstGeom prst="rect">
             <a:avLst/>
@@ -4870,7 +4747,7 @@
         <p:spPr>
           <a:xfrm>
             <a:off x="360" y="200160"/>
-            <a:ext cx="7919280" cy="699480"/>
+            <a:ext cx="7918920" cy="699120"/>
           </a:xfrm>
           <a:prstGeom prst="rect">
             <a:avLst/>

</xml_diff>